<commit_message>
Grafik og tilemaps 1
</commit_message>
<xml_diff>
--- a/forlob7_grafik/DDU - grafik.pptx
+++ b/forlob7_grafik/DDU - grafik.pptx
@@ -265,7 +265,7 @@
           <a:p>
             <a:fld id="{BEEF9D3C-DE02-4717-B358-5E97D90D9407}" type="datetimeFigureOut">
               <a:rPr lang="da-DK" smtClean="0"/>
-              <a:t>08-11-2023</a:t>
+              <a:t>08-09-2024</a:t>
             </a:fld>
             <a:endParaRPr lang="da-DK"/>
           </a:p>
@@ -463,7 +463,7 @@
           <a:p>
             <a:fld id="{BEEF9D3C-DE02-4717-B358-5E97D90D9407}" type="datetimeFigureOut">
               <a:rPr lang="da-DK" smtClean="0"/>
-              <a:t>08-11-2023</a:t>
+              <a:t>08-09-2024</a:t>
             </a:fld>
             <a:endParaRPr lang="da-DK"/>
           </a:p>
@@ -671,7 +671,7 @@
           <a:p>
             <a:fld id="{BEEF9D3C-DE02-4717-B358-5E97D90D9407}" type="datetimeFigureOut">
               <a:rPr lang="da-DK" smtClean="0"/>
-              <a:t>08-11-2023</a:t>
+              <a:t>08-09-2024</a:t>
             </a:fld>
             <a:endParaRPr lang="da-DK"/>
           </a:p>
@@ -869,7 +869,7 @@
           <a:p>
             <a:fld id="{BEEF9D3C-DE02-4717-B358-5E97D90D9407}" type="datetimeFigureOut">
               <a:rPr lang="da-DK" smtClean="0"/>
-              <a:t>08-11-2023</a:t>
+              <a:t>08-09-2024</a:t>
             </a:fld>
             <a:endParaRPr lang="da-DK"/>
           </a:p>
@@ -1144,7 +1144,7 @@
           <a:p>
             <a:fld id="{BEEF9D3C-DE02-4717-B358-5E97D90D9407}" type="datetimeFigureOut">
               <a:rPr lang="da-DK" smtClean="0"/>
-              <a:t>08-11-2023</a:t>
+              <a:t>08-09-2024</a:t>
             </a:fld>
             <a:endParaRPr lang="da-DK"/>
           </a:p>
@@ -1409,7 +1409,7 @@
           <a:p>
             <a:fld id="{BEEF9D3C-DE02-4717-B358-5E97D90D9407}" type="datetimeFigureOut">
               <a:rPr lang="da-DK" smtClean="0"/>
-              <a:t>08-11-2023</a:t>
+              <a:t>08-09-2024</a:t>
             </a:fld>
             <a:endParaRPr lang="da-DK"/>
           </a:p>
@@ -1821,7 +1821,7 @@
           <a:p>
             <a:fld id="{BEEF9D3C-DE02-4717-B358-5E97D90D9407}" type="datetimeFigureOut">
               <a:rPr lang="da-DK" smtClean="0"/>
-              <a:t>08-11-2023</a:t>
+              <a:t>08-09-2024</a:t>
             </a:fld>
             <a:endParaRPr lang="da-DK"/>
           </a:p>
@@ -1962,7 +1962,7 @@
           <a:p>
             <a:fld id="{BEEF9D3C-DE02-4717-B358-5E97D90D9407}" type="datetimeFigureOut">
               <a:rPr lang="da-DK" smtClean="0"/>
-              <a:t>08-11-2023</a:t>
+              <a:t>08-09-2024</a:t>
             </a:fld>
             <a:endParaRPr lang="da-DK"/>
           </a:p>
@@ -2075,7 +2075,7 @@
           <a:p>
             <a:fld id="{BEEF9D3C-DE02-4717-B358-5E97D90D9407}" type="datetimeFigureOut">
               <a:rPr lang="da-DK" smtClean="0"/>
-              <a:t>08-11-2023</a:t>
+              <a:t>08-09-2024</a:t>
             </a:fld>
             <a:endParaRPr lang="da-DK"/>
           </a:p>
@@ -2386,7 +2386,7 @@
           <a:p>
             <a:fld id="{BEEF9D3C-DE02-4717-B358-5E97D90D9407}" type="datetimeFigureOut">
               <a:rPr lang="da-DK" smtClean="0"/>
-              <a:t>08-11-2023</a:t>
+              <a:t>08-09-2024</a:t>
             </a:fld>
             <a:endParaRPr lang="da-DK"/>
           </a:p>
@@ -2674,7 +2674,7 @@
           <a:p>
             <a:fld id="{BEEF9D3C-DE02-4717-B358-5E97D90D9407}" type="datetimeFigureOut">
               <a:rPr lang="da-DK" smtClean="0"/>
-              <a:t>08-11-2023</a:t>
+              <a:t>08-09-2024</a:t>
             </a:fld>
             <a:endParaRPr lang="da-DK"/>
           </a:p>
@@ -2915,7 +2915,7 @@
           <a:p>
             <a:fld id="{BEEF9D3C-DE02-4717-B358-5E97D90D9407}" type="datetimeFigureOut">
               <a:rPr lang="da-DK" smtClean="0"/>
-              <a:t>08-11-2023</a:t>
+              <a:t>08-09-2024</a:t>
             </a:fld>
             <a:endParaRPr lang="da-DK"/>
           </a:p>
@@ -3355,8 +3355,13 @@
           <a:p>
             <a:r>
               <a:rPr lang="da-DK" dirty="0"/>
-              <a:t>DDU - grafik</a:t>
-            </a:r>
+              <a:t>DDU – grafik og </a:t>
+            </a:r>
+            <a:r>
+              <a:rPr lang="da-DK" dirty="0" err="1"/>
+              <a:t>tilemaps</a:t>
+            </a:r>
+            <a:endParaRPr lang="da-DK" dirty="0"/>
           </a:p>
         </p:txBody>
       </p:sp>
@@ -4103,15 +4108,7 @@
             </a:br>
             <a:r>
               <a:rPr lang="da-DK" dirty="0"/>
-              <a:t>Dokument: ”Links til videoer </a:t>
-            </a:r>
-            <a:r>
-              <a:rPr lang="da-DK"/>
-              <a:t>og øvelser </a:t>
-            </a:r>
-            <a:r>
-              <a:rPr lang="da-DK" dirty="0"/>
-              <a:t>med GIMP”</a:t>
+              <a:t>Dokument: ”Links til videoer og øvelser med GIMP”</a:t>
             </a:r>
             <a:br>
               <a:rPr lang="da-DK" dirty="0"/>
@@ -4134,7 +4131,7 @@
             </a:br>
             <a:r>
               <a:rPr lang="da-DK" sz="2600" dirty="0"/>
-              <a:t>Gennemgang af de mest almindelige metoder i GIMP </a:t>
+              <a:t>Se ovenstående dokument og de links der er i dokumentet. </a:t>
             </a:r>
             <a:r>
               <a:rPr lang="da-DK" sz="3200" dirty="0"/>
@@ -4192,85 +4189,133 @@
       </p:grpSpPr>
       <p:sp>
         <p:nvSpPr>
-          <p:cNvPr id="2" name="Tekstfelt 1">
-            <a:extLst>
-              <a:ext uri="{FF2B5EF4-FFF2-40B4-BE49-F238E27FC236}">
-                <a16:creationId xmlns:a16="http://schemas.microsoft.com/office/drawing/2014/main" id="{B707DE2B-4F4E-39CD-22B6-023AFDC29D97}"/>
-              </a:ext>
-            </a:extLst>
-          </p:cNvPr>
-          <p:cNvSpPr txBox="1"/>
-          <p:nvPr/>
-        </p:nvSpPr>
-        <p:spPr>
-          <a:xfrm>
-            <a:off x="923925" y="904875"/>
-            <a:ext cx="10355335" cy="3046988"/>
-          </a:xfrm>
-          <a:prstGeom prst="rect">
-            <a:avLst/>
-          </a:prstGeom>
-          <a:noFill/>
-        </p:spPr>
-        <p:txBody>
-          <a:bodyPr wrap="none" rtlCol="0">
-            <a:spAutoFit/>
-          </a:bodyPr>
-          <a:lstStyle/>
-          <a:p>
-            <a:r>
-              <a:rPr lang="da-DK" sz="2400" dirty="0"/>
-              <a:t>Gennemgang af GIMP ligger som tre film på DigitaltDesignLyngby.github.io under </a:t>
+          <p:cNvPr id="2" name="Titel 1">
+            <a:extLst>
+              <a:ext uri="{FF2B5EF4-FFF2-40B4-BE49-F238E27FC236}">
+                <a16:creationId xmlns:a16="http://schemas.microsoft.com/office/drawing/2014/main" id="{AC1B8AAA-CA1B-B1F1-9E46-DC08E6EC3185}"/>
+              </a:ext>
+            </a:extLst>
+          </p:cNvPr>
+          <p:cNvSpPr>
+            <a:spLocks noGrp="1"/>
+          </p:cNvSpPr>
+          <p:nvPr>
+            <p:ph type="title"/>
+          </p:nvPr>
+        </p:nvSpPr>
+        <p:spPr/>
+        <p:txBody>
+          <a:bodyPr/>
+          <a:lstStyle/>
+          <a:p>
+            <a:r>
+              <a:rPr lang="da-DK" dirty="0" err="1"/>
+              <a:t>Tilemaps</a:t>
+            </a:r>
+            <a:endParaRPr lang="da-DK" dirty="0"/>
+          </a:p>
+        </p:txBody>
+      </p:sp>
+      <p:sp>
+        <p:nvSpPr>
+          <p:cNvPr id="3" name="Pladsholder til indhold 2">
+            <a:extLst>
+              <a:ext uri="{FF2B5EF4-FFF2-40B4-BE49-F238E27FC236}">
+                <a16:creationId xmlns:a16="http://schemas.microsoft.com/office/drawing/2014/main" id="{99C02034-B3B3-4E85-AC62-041385EE0957}"/>
+              </a:ext>
+            </a:extLst>
+          </p:cNvPr>
+          <p:cNvSpPr>
+            <a:spLocks noGrp="1"/>
+          </p:cNvSpPr>
+          <p:nvPr>
+            <p:ph idx="1"/>
+          </p:nvPr>
+        </p:nvSpPr>
+        <p:spPr/>
+        <p:txBody>
+          <a:bodyPr/>
+          <a:lstStyle/>
+          <a:p>
+            <a:pPr marL="0" indent="0">
+              <a:buNone/>
+            </a:pPr>
+            <a:r>
+              <a:rPr lang="da-DK" dirty="0"/>
+              <a:t>Inden værkstedsugen (38) hvor I skal lave jeres første spil, er det vigtigt at I har fået en forståelse af </a:t>
+            </a:r>
+            <a:r>
+              <a:rPr lang="da-DK" dirty="0" err="1"/>
+              <a:t>TileMaps</a:t>
+            </a:r>
+            <a:r>
+              <a:rPr lang="da-DK" dirty="0"/>
+              <a:t> i </a:t>
+            </a:r>
+            <a:r>
+              <a:rPr lang="da-DK" dirty="0" err="1"/>
+              <a:t>Godot</a:t>
+            </a:r>
+            <a:r>
+              <a:rPr lang="da-DK" dirty="0"/>
+              <a:t>.</a:t>
             </a:r>
             <a:br>
-              <a:rPr lang="da-DK" sz="2400" dirty="0"/>
+              <a:rPr lang="da-DK" dirty="0"/>
             </a:br>
-            <a:r>
-              <a:rPr lang="da-DK" sz="2400" dirty="0"/>
-              <a:t>forloeb7_grafik</a:t>
-            </a:r>
-          </a:p>
-          <a:p>
-            <a:endParaRPr lang="da-DK" sz="2400" dirty="0"/>
-          </a:p>
-          <a:p>
-            <a:r>
-              <a:rPr lang="da-DK" sz="2400" dirty="0"/>
-              <a:t>Filmene gennemgår:</a:t>
-            </a:r>
-          </a:p>
-          <a:p>
-            <a:endParaRPr lang="da-DK" sz="2400" dirty="0"/>
-          </a:p>
-          <a:p>
-            <a:r>
-              <a:rPr lang="da-DK" sz="2400" dirty="0"/>
-              <a:t>	Indstilling af GIMP</a:t>
-            </a:r>
-          </a:p>
-          <a:p>
-            <a:r>
-              <a:rPr lang="da-DK" sz="2400" dirty="0"/>
-              <a:t>	Top menu i GIMP</a:t>
-            </a:r>
-          </a:p>
-          <a:p>
-            <a:r>
-              <a:rPr lang="da-DK" sz="2400" dirty="0"/>
-              <a:t>	Brug </a:t>
-            </a:r>
-            <a:r>
-              <a:rPr lang="da-DK" sz="2400"/>
-              <a:t>af udvalgte værktøjer og lag i GIMP </a:t>
-            </a:r>
-            <a:endParaRPr lang="da-DK" sz="2400" dirty="0"/>
+            <a:br>
+              <a:rPr lang="da-DK" dirty="0"/>
+            </a:br>
+            <a:r>
+              <a:rPr lang="da-DK" dirty="0"/>
+              <a:t>I de få timer vi har indtil da er det meningen af I skal ”rode” lidt rundt og se de videoer som I tænker vil give jeg noget vigtig info omkring det at lave spillebaner med </a:t>
+            </a:r>
+            <a:r>
+              <a:rPr lang="da-DK" dirty="0" err="1"/>
+              <a:t>TileMaps</a:t>
+            </a:r>
+            <a:r>
+              <a:rPr lang="da-DK" dirty="0"/>
+              <a:t>.</a:t>
+            </a:r>
+            <a:br>
+              <a:rPr lang="da-DK" dirty="0"/>
+            </a:br>
+            <a:endParaRPr lang="da-DK" dirty="0"/>
+          </a:p>
+          <a:p>
+            <a:pPr marL="0" indent="0">
+              <a:buNone/>
+            </a:pPr>
+            <a:r>
+              <a:rPr lang="da-DK" dirty="0"/>
+              <a:t>Se på DigitaltDesignLyngby.github.io sitet, her er der et intro dokument som vil guide jer til en række forskellige </a:t>
+            </a:r>
+            <a:r>
+              <a:rPr lang="da-DK" dirty="0" err="1"/>
+              <a:t>tutorials</a:t>
+            </a:r>
+            <a:r>
+              <a:rPr lang="da-DK" dirty="0"/>
+              <a:t> m.m.</a:t>
+            </a:r>
+            <a:br>
+              <a:rPr lang="da-DK" dirty="0"/>
+            </a:br>
+            <a:endParaRPr lang="da-DK" dirty="0"/>
+          </a:p>
+          <a:p>
+            <a:pPr marL="0" indent="0">
+              <a:buNone/>
+            </a:pPr>
+            <a:endParaRPr lang="da-DK" dirty="0"/>
           </a:p>
         </p:txBody>
       </p:sp>
     </p:spTree>
     <p:extLst>
       <p:ext uri="{BB962C8B-B14F-4D97-AF65-F5344CB8AC3E}">
-        <p14:creationId xmlns:p14="http://schemas.microsoft.com/office/powerpoint/2010/main" val="895214100"/>
+        <p14:creationId xmlns:p14="http://schemas.microsoft.com/office/powerpoint/2010/main" val="312042407"/>
       </p:ext>
     </p:extLst>
   </p:cSld>

</xml_diff>